<commit_message>
Mudanças no Banner e Imagens Adicionadas
</commit_message>
<xml_diff>
--- a/documentos/Banner_FECAP_CCOMP4_BAROESDOCUPOM.pptx
+++ b/documentos/Banner_FECAP_CCOMP4_BAROESDOCUPOM.pptx
@@ -5292,7 +5292,7 @@
         </p:blipFill>
         <p:spPr bwMode="auto">
           <a:xfrm>
-            <a:off x="10476871" y="11897503"/>
+            <a:off x="9118864" y="12010160"/>
             <a:ext cx="1595516" cy="1773519"/>
           </a:xfrm>
           <a:prstGeom prst="rect">
@@ -5339,7 +5339,7 @@
         </p:blipFill>
         <p:spPr bwMode="auto">
           <a:xfrm>
-            <a:off x="12954806" y="11823920"/>
+            <a:off x="11558705" y="12012130"/>
             <a:ext cx="1791433" cy="1773519"/>
           </a:xfrm>
           <a:prstGeom prst="rect">
@@ -5386,7 +5386,7 @@
         </p:blipFill>
         <p:spPr bwMode="auto">
           <a:xfrm>
-            <a:off x="15452921" y="11737949"/>
+            <a:off x="13987548" y="11930413"/>
             <a:ext cx="2092626" cy="2092626"/>
           </a:xfrm>
           <a:prstGeom prst="rect">
@@ -5433,7 +5433,7 @@
         </p:blipFill>
         <p:spPr bwMode="auto">
           <a:xfrm>
-            <a:off x="21572409" y="11991102"/>
+            <a:off x="23381910" y="12107629"/>
             <a:ext cx="1569469" cy="1569469"/>
           </a:xfrm>
           <a:prstGeom prst="rect">
@@ -5449,240 +5449,6 @@
               </a14:hiddenFill>
             </a:ext>
           </a:extLst>
-        </p:spPr>
-      </p:pic>
-      <p:pic>
-        <p:nvPicPr>
-          <p:cNvPr id="25" name="Picture 24">
-            <a:extLst>
-              <a:ext uri="{FF2B5EF4-FFF2-40B4-BE49-F238E27FC236}">
-                <a16:creationId xmlns:a16="http://schemas.microsoft.com/office/drawing/2014/main" id="{D62DF8E4-A8A4-8314-1D86-97A29C1F27B0}"/>
-              </a:ext>
-            </a:extLst>
-          </p:cNvPr>
-          <p:cNvPicPr>
-            <a:picLocks noChangeAspect="1"/>
-          </p:cNvPicPr>
-          <p:nvPr/>
-        </p:nvPicPr>
-        <p:blipFill>
-          <a:blip r:embed="rId10"/>
-          <a:stretch>
-            <a:fillRect/>
-          </a:stretch>
-        </p:blipFill>
-        <p:spPr>
-          <a:xfrm>
-            <a:off x="1006724" y="14571894"/>
-            <a:ext cx="13170438" cy="5866392"/>
-          </a:xfrm>
-          <a:prstGeom prst="rect">
-            <a:avLst/>
-          </a:prstGeom>
-        </p:spPr>
-      </p:pic>
-      <p:pic>
-        <p:nvPicPr>
-          <p:cNvPr id="27" name="Picture 26">
-            <a:extLst>
-              <a:ext uri="{FF2B5EF4-FFF2-40B4-BE49-F238E27FC236}">
-                <a16:creationId xmlns:a16="http://schemas.microsoft.com/office/drawing/2014/main" id="{1DF5D1F3-A547-8224-2DD5-3823033B240C}"/>
-              </a:ext>
-            </a:extLst>
-          </p:cNvPr>
-          <p:cNvPicPr>
-            <a:picLocks noChangeAspect="1"/>
-          </p:cNvPicPr>
-          <p:nvPr/>
-        </p:nvPicPr>
-        <p:blipFill>
-          <a:blip r:embed="rId11"/>
-          <a:stretch>
-            <a:fillRect/>
-          </a:stretch>
-        </p:blipFill>
-        <p:spPr>
-          <a:xfrm>
-            <a:off x="1006724" y="20737245"/>
-            <a:ext cx="13170438" cy="5688122"/>
-          </a:xfrm>
-          <a:prstGeom prst="rect">
-            <a:avLst/>
-          </a:prstGeom>
-        </p:spPr>
-      </p:pic>
-      <p:pic>
-        <p:nvPicPr>
-          <p:cNvPr id="30" name="Picture 29">
-            <a:extLst>
-              <a:ext uri="{FF2B5EF4-FFF2-40B4-BE49-F238E27FC236}">
-                <a16:creationId xmlns:a16="http://schemas.microsoft.com/office/drawing/2014/main" id="{85DE3E08-6443-7012-08B2-A1D446E6CA8E}"/>
-              </a:ext>
-            </a:extLst>
-          </p:cNvPr>
-          <p:cNvPicPr>
-            <a:picLocks noChangeAspect="1"/>
-          </p:cNvPicPr>
-          <p:nvPr/>
-        </p:nvPicPr>
-        <p:blipFill>
-          <a:blip r:embed="rId12"/>
-          <a:stretch>
-            <a:fillRect/>
-          </a:stretch>
-        </p:blipFill>
-        <p:spPr>
-          <a:xfrm>
-            <a:off x="1029730" y="26759188"/>
-            <a:ext cx="13147432" cy="5674535"/>
-          </a:xfrm>
-          <a:prstGeom prst="rect">
-            <a:avLst/>
-          </a:prstGeom>
-        </p:spPr>
-      </p:pic>
-      <p:pic>
-        <p:nvPicPr>
-          <p:cNvPr id="32" name="Picture 31" descr="A graph with blue squares&#10;&#10;AI-generated content may be incorrect.">
-            <a:extLst>
-              <a:ext uri="{FF2B5EF4-FFF2-40B4-BE49-F238E27FC236}">
-                <a16:creationId xmlns:a16="http://schemas.microsoft.com/office/drawing/2014/main" id="{D23432E2-216B-8EE0-B23F-5D684A6BCD80}"/>
-              </a:ext>
-            </a:extLst>
-          </p:cNvPr>
-          <p:cNvPicPr>
-            <a:picLocks noChangeAspect="1"/>
-          </p:cNvPicPr>
-          <p:nvPr/>
-        </p:nvPicPr>
-        <p:blipFill>
-          <a:blip r:embed="rId13">
-            <a:extLst>
-              <a:ext uri="{28A0092B-C50C-407E-A947-70E740481C1C}">
-                <a14:useLocalDpi xmlns:a14="http://schemas.microsoft.com/office/drawing/2010/main" val="0"/>
-              </a:ext>
-            </a:extLst>
-          </a:blip>
-          <a:stretch>
-            <a:fillRect/>
-          </a:stretch>
-        </p:blipFill>
-        <p:spPr>
-          <a:xfrm>
-            <a:off x="15149228" y="14571893"/>
-            <a:ext cx="6523791" cy="4659851"/>
-          </a:xfrm>
-          <a:prstGeom prst="rect">
-            <a:avLst/>
-          </a:prstGeom>
-        </p:spPr>
-      </p:pic>
-      <p:pic>
-        <p:nvPicPr>
-          <p:cNvPr id="34" name="Picture 33" descr="A graph of days of the week&#10;&#10;AI-generated content may be incorrect.">
-            <a:extLst>
-              <a:ext uri="{FF2B5EF4-FFF2-40B4-BE49-F238E27FC236}">
-                <a16:creationId xmlns:a16="http://schemas.microsoft.com/office/drawing/2014/main" id="{C414A915-1FDF-CAA4-C7CA-A5AC3902482E}"/>
-              </a:ext>
-            </a:extLst>
-          </p:cNvPr>
-          <p:cNvPicPr>
-            <a:picLocks noChangeAspect="1"/>
-          </p:cNvPicPr>
-          <p:nvPr/>
-        </p:nvPicPr>
-        <p:blipFill>
-          <a:blip r:embed="rId14">
-            <a:extLst>
-              <a:ext uri="{28A0092B-C50C-407E-A947-70E740481C1C}">
-                <a14:useLocalDpi xmlns:a14="http://schemas.microsoft.com/office/drawing/2010/main" val="0"/>
-              </a:ext>
-            </a:extLst>
-          </a:blip>
-          <a:stretch>
-            <a:fillRect/>
-          </a:stretch>
-        </p:blipFill>
-        <p:spPr>
-          <a:xfrm>
-            <a:off x="22125258" y="14571893"/>
-            <a:ext cx="4588322" cy="4768464"/>
-          </a:xfrm>
-          <a:prstGeom prst="rect">
-            <a:avLst/>
-          </a:prstGeom>
-        </p:spPr>
-      </p:pic>
-      <p:pic>
-        <p:nvPicPr>
-          <p:cNvPr id="36" name="Picture 35" descr="A purple and yellow rectangles with white text&#10;&#10;AI-generated content may be incorrect.">
-            <a:extLst>
-              <a:ext uri="{FF2B5EF4-FFF2-40B4-BE49-F238E27FC236}">
-                <a16:creationId xmlns:a16="http://schemas.microsoft.com/office/drawing/2014/main" id="{B857EB07-9818-08F8-3203-AB188F63A337}"/>
-              </a:ext>
-            </a:extLst>
-          </p:cNvPr>
-          <p:cNvPicPr>
-            <a:picLocks noChangeAspect="1"/>
-          </p:cNvPicPr>
-          <p:nvPr/>
-        </p:nvPicPr>
-        <p:blipFill>
-          <a:blip r:embed="rId15">
-            <a:extLst>
-              <a:ext uri="{28A0092B-C50C-407E-A947-70E740481C1C}">
-                <a14:useLocalDpi xmlns:a14="http://schemas.microsoft.com/office/drawing/2010/main" val="0"/>
-              </a:ext>
-            </a:extLst>
-          </a:blip>
-          <a:stretch>
-            <a:fillRect/>
-          </a:stretch>
-        </p:blipFill>
-        <p:spPr>
-          <a:xfrm>
-            <a:off x="15149228" y="19851801"/>
-            <a:ext cx="6943725" cy="4286250"/>
-          </a:xfrm>
-          <a:prstGeom prst="rect">
-            <a:avLst/>
-          </a:prstGeom>
-        </p:spPr>
-      </p:pic>
-      <p:pic>
-        <p:nvPicPr>
-          <p:cNvPr id="40" name="Picture 39" descr="A graph of numbers and a number of numbers&#10;&#10;AI-generated content may be incorrect.">
-            <a:extLst>
-              <a:ext uri="{FF2B5EF4-FFF2-40B4-BE49-F238E27FC236}">
-                <a16:creationId xmlns:a16="http://schemas.microsoft.com/office/drawing/2014/main" id="{949A7092-2C68-3043-8509-25AA150F04C9}"/>
-              </a:ext>
-            </a:extLst>
-          </p:cNvPr>
-          <p:cNvPicPr>
-            <a:picLocks noChangeAspect="1"/>
-          </p:cNvPicPr>
-          <p:nvPr/>
-        </p:nvPicPr>
-        <p:blipFill>
-          <a:blip r:embed="rId16">
-            <a:extLst>
-              <a:ext uri="{28A0092B-C50C-407E-A947-70E740481C1C}">
-                <a14:useLocalDpi xmlns:a14="http://schemas.microsoft.com/office/drawing/2010/main" val="0"/>
-              </a:ext>
-            </a:extLst>
-          </a:blip>
-          <a:stretch>
-            <a:fillRect/>
-          </a:stretch>
-        </p:blipFill>
-        <p:spPr>
-          <a:xfrm>
-            <a:off x="23517390" y="19851801"/>
-            <a:ext cx="3190875" cy="4286250"/>
-          </a:xfrm>
-          <a:prstGeom prst="rect">
-            <a:avLst/>
-          </a:prstGeom>
         </p:spPr>
       </p:pic>
       <p:pic>
@@ -5700,7 +5466,7 @@
           <p:nvPr/>
         </p:nvPicPr>
         <p:blipFill>
-          <a:blip r:embed="rId17">
+          <a:blip r:embed="rId10">
             <a:extLst>
               <a:ext uri="{28A0092B-C50C-407E-A947-70E740481C1C}">
                 <a14:useLocalDpi xmlns:a14="http://schemas.microsoft.com/office/drawing/2010/main" val="0"/>
@@ -5713,7 +5479,7 @@
         </p:blipFill>
         <p:spPr>
           <a:xfrm>
-            <a:off x="5292059" y="11715583"/>
+            <a:off x="3288808" y="11988751"/>
             <a:ext cx="1963255" cy="1963255"/>
           </a:xfrm>
           <a:prstGeom prst="rect">
@@ -5727,6 +5493,245 @@
             <a:extLst>
               <a:ext uri="{FF2B5EF4-FFF2-40B4-BE49-F238E27FC236}">
                 <a16:creationId xmlns:a16="http://schemas.microsoft.com/office/drawing/2014/main" id="{F2B8ADEB-340B-4B69-8D03-966420166AAA}"/>
+              </a:ext>
+            </a:extLst>
+          </p:cNvPr>
+          <p:cNvPicPr>
+            <a:picLocks noChangeAspect="1"/>
+          </p:cNvPicPr>
+          <p:nvPr/>
+        </p:nvPicPr>
+        <p:blipFill>
+          <a:blip r:embed="rId11" cstate="print">
+            <a:extLst>
+              <a:ext uri="{28A0092B-C50C-407E-A947-70E740481C1C}">
+                <a14:useLocalDpi xmlns:a14="http://schemas.microsoft.com/office/drawing/2010/main" val="0"/>
+              </a:ext>
+            </a:extLst>
+          </a:blip>
+          <a:stretch>
+            <a:fillRect/>
+          </a:stretch>
+        </p:blipFill>
+        <p:spPr>
+          <a:xfrm>
+            <a:off x="5751014" y="11666358"/>
+            <a:ext cx="2452009" cy="2452009"/>
+          </a:xfrm>
+          <a:prstGeom prst="rect">
+            <a:avLst/>
+          </a:prstGeom>
+        </p:spPr>
+      </p:pic>
+      <p:pic>
+        <p:nvPicPr>
+          <p:cNvPr id="19" name="Imagem 18">
+            <a:extLst>
+              <a:ext uri="{FF2B5EF4-FFF2-40B4-BE49-F238E27FC236}">
+                <a16:creationId xmlns:a16="http://schemas.microsoft.com/office/drawing/2014/main" id="{9658550D-8CBD-43F2-97C5-868F2C4ABC69}"/>
+              </a:ext>
+            </a:extLst>
+          </p:cNvPr>
+          <p:cNvPicPr>
+            <a:picLocks noChangeAspect="1"/>
+          </p:cNvPicPr>
+          <p:nvPr/>
+        </p:nvPicPr>
+        <p:blipFill>
+          <a:blip r:embed="rId12">
+            <a:extLst>
+              <a:ext uri="{28A0092B-C50C-407E-A947-70E740481C1C}">
+                <a14:useLocalDpi xmlns:a14="http://schemas.microsoft.com/office/drawing/2010/main" val="0"/>
+              </a:ext>
+            </a:extLst>
+          </a:blip>
+          <a:stretch>
+            <a:fillRect/>
+          </a:stretch>
+        </p:blipFill>
+        <p:spPr>
+          <a:xfrm>
+            <a:off x="16831713" y="12151134"/>
+            <a:ext cx="1638487" cy="1638487"/>
+          </a:xfrm>
+          <a:prstGeom prst="rect">
+            <a:avLst/>
+          </a:prstGeom>
+        </p:spPr>
+      </p:pic>
+      <p:pic>
+        <p:nvPicPr>
+          <p:cNvPr id="13" name="Imagem 12">
+            <a:extLst>
+              <a:ext uri="{FF2B5EF4-FFF2-40B4-BE49-F238E27FC236}">
+                <a16:creationId xmlns:a16="http://schemas.microsoft.com/office/drawing/2014/main" id="{186BA1B1-2801-EE7A-1703-E8B0694FBF83}"/>
+              </a:ext>
+            </a:extLst>
+          </p:cNvPr>
+          <p:cNvPicPr>
+            <a:picLocks noChangeAspect="1"/>
+          </p:cNvPicPr>
+          <p:nvPr/>
+        </p:nvPicPr>
+        <p:blipFill>
+          <a:blip r:embed="rId13"/>
+          <a:stretch>
+            <a:fillRect/>
+          </a:stretch>
+        </p:blipFill>
+        <p:spPr>
+          <a:xfrm>
+            <a:off x="1728789" y="22118325"/>
+            <a:ext cx="5895875" cy="10271651"/>
+          </a:xfrm>
+          <a:prstGeom prst="rect">
+            <a:avLst/>
+          </a:prstGeom>
+        </p:spPr>
+      </p:pic>
+      <p:pic>
+        <p:nvPicPr>
+          <p:cNvPr id="18" name="Imagem 17">
+            <a:extLst>
+              <a:ext uri="{FF2B5EF4-FFF2-40B4-BE49-F238E27FC236}">
+                <a16:creationId xmlns:a16="http://schemas.microsoft.com/office/drawing/2014/main" id="{A1C32A65-764B-A334-366E-E343BD00E933}"/>
+              </a:ext>
+            </a:extLst>
+          </p:cNvPr>
+          <p:cNvPicPr>
+            <a:picLocks noChangeAspect="1"/>
+          </p:cNvPicPr>
+          <p:nvPr/>
+        </p:nvPicPr>
+        <p:blipFill>
+          <a:blip r:embed="rId14"/>
+          <a:stretch>
+            <a:fillRect/>
+          </a:stretch>
+        </p:blipFill>
+        <p:spPr>
+          <a:xfrm>
+            <a:off x="16799193" y="14284331"/>
+            <a:ext cx="9945643" cy="7633393"/>
+          </a:xfrm>
+          <a:prstGeom prst="rect">
+            <a:avLst/>
+          </a:prstGeom>
+        </p:spPr>
+      </p:pic>
+      <p:pic>
+        <p:nvPicPr>
+          <p:cNvPr id="1028" name="Picture 4">
+            <a:extLst>
+              <a:ext uri="{FF2B5EF4-FFF2-40B4-BE49-F238E27FC236}">
+                <a16:creationId xmlns:a16="http://schemas.microsoft.com/office/drawing/2014/main" id="{589D341B-FE15-8D04-3C8D-8E5818829C26}"/>
+              </a:ext>
+            </a:extLst>
+          </p:cNvPr>
+          <p:cNvPicPr>
+            <a:picLocks noChangeAspect="1" noChangeArrowheads="1"/>
+          </p:cNvPicPr>
+          <p:nvPr/>
+        </p:nvPicPr>
+        <p:blipFill>
+          <a:blip r:embed="rId15" cstate="print">
+            <a:extLst>
+              <a:ext uri="{28A0092B-C50C-407E-A947-70E740481C1C}">
+                <a14:useLocalDpi xmlns:a14="http://schemas.microsoft.com/office/drawing/2010/main" val="0"/>
+              </a:ext>
+            </a:extLst>
+          </a:blip>
+          <a:srcRect/>
+          <a:stretch>
+            <a:fillRect/>
+          </a:stretch>
+        </p:blipFill>
+        <p:spPr bwMode="auto">
+          <a:xfrm>
+            <a:off x="19543680" y="12443002"/>
+            <a:ext cx="2730036" cy="1069264"/>
+          </a:xfrm>
+          <a:prstGeom prst="rect">
+            <a:avLst/>
+          </a:prstGeom>
+          <a:noFill/>
+          <a:extLst>
+            <a:ext uri="{909E8E84-426E-40DD-AFC4-6F175D3DCCD1}">
+              <a14:hiddenFill xmlns:a14="http://schemas.microsoft.com/office/drawing/2010/main">
+                <a:solidFill>
+                  <a:srgbClr val="FFFFFF"/>
+                </a:solidFill>
+              </a14:hiddenFill>
+            </a:ext>
+          </a:extLst>
+        </p:spPr>
+      </p:pic>
+      <p:pic>
+        <p:nvPicPr>
+          <p:cNvPr id="23" name="Imagem 22">
+            <a:extLst>
+              <a:ext uri="{FF2B5EF4-FFF2-40B4-BE49-F238E27FC236}">
+                <a16:creationId xmlns:a16="http://schemas.microsoft.com/office/drawing/2014/main" id="{2C7219CD-8681-B610-DACD-16AFD9D15662}"/>
+              </a:ext>
+            </a:extLst>
+          </p:cNvPr>
+          <p:cNvPicPr>
+            <a:picLocks noChangeAspect="1"/>
+          </p:cNvPicPr>
+          <p:nvPr/>
+        </p:nvPicPr>
+        <p:blipFill>
+          <a:blip r:embed="rId16"/>
+          <a:stretch>
+            <a:fillRect/>
+          </a:stretch>
+        </p:blipFill>
+        <p:spPr>
+          <a:xfrm>
+            <a:off x="8361777" y="22157084"/>
+            <a:ext cx="8124689" cy="10211820"/>
+          </a:xfrm>
+          <a:prstGeom prst="rect">
+            <a:avLst/>
+          </a:prstGeom>
+        </p:spPr>
+      </p:pic>
+      <p:pic>
+        <p:nvPicPr>
+          <p:cNvPr id="26" name="Imagem 25">
+            <a:extLst>
+              <a:ext uri="{FF2B5EF4-FFF2-40B4-BE49-F238E27FC236}">
+                <a16:creationId xmlns:a16="http://schemas.microsoft.com/office/drawing/2014/main" id="{3887F7F8-D197-920C-6439-4B16317FBF61}"/>
+              </a:ext>
+            </a:extLst>
+          </p:cNvPr>
+          <p:cNvPicPr>
+            <a:picLocks noChangeAspect="1"/>
+          </p:cNvPicPr>
+          <p:nvPr/>
+        </p:nvPicPr>
+        <p:blipFill>
+          <a:blip r:embed="rId17"/>
+          <a:stretch>
+            <a:fillRect/>
+          </a:stretch>
+        </p:blipFill>
+        <p:spPr>
+          <a:xfrm>
+            <a:off x="1666492" y="14283280"/>
+            <a:ext cx="14847830" cy="7634444"/>
+          </a:xfrm>
+          <a:prstGeom prst="rect">
+            <a:avLst/>
+          </a:prstGeom>
+        </p:spPr>
+      </p:pic>
+      <p:pic>
+        <p:nvPicPr>
+          <p:cNvPr id="31" name="Imagem 30" descr="Código QR&#10;&#10;O conteúdo gerado por IA pode estar incorreto.">
+            <a:extLst>
+              <a:ext uri="{FF2B5EF4-FFF2-40B4-BE49-F238E27FC236}">
+                <a16:creationId xmlns:a16="http://schemas.microsoft.com/office/drawing/2014/main" id="{5BE1B6FC-9F16-4CC2-1C51-95846AFC1877}"/>
               </a:ext>
             </a:extLst>
           </p:cNvPr>
@@ -5749,80 +5754,8 @@
         </p:blipFill>
         <p:spPr>
           <a:xfrm>
-            <a:off x="7339881" y="11444683"/>
-            <a:ext cx="2452009" cy="2452009"/>
-          </a:xfrm>
-          <a:prstGeom prst="rect">
-            <a:avLst/>
-          </a:prstGeom>
-        </p:spPr>
-      </p:pic>
-      <p:pic>
-        <p:nvPicPr>
-          <p:cNvPr id="19" name="Imagem 18">
-            <a:extLst>
-              <a:ext uri="{FF2B5EF4-FFF2-40B4-BE49-F238E27FC236}">
-                <a16:creationId xmlns:a16="http://schemas.microsoft.com/office/drawing/2014/main" id="{9658550D-8CBD-43F2-97C5-868F2C4ABC69}"/>
-              </a:ext>
-            </a:extLst>
-          </p:cNvPr>
-          <p:cNvPicPr>
-            <a:picLocks noChangeAspect="1"/>
-          </p:cNvPicPr>
-          <p:nvPr/>
-        </p:nvPicPr>
-        <p:blipFill>
-          <a:blip r:embed="rId19">
-            <a:extLst>
-              <a:ext uri="{28A0092B-C50C-407E-A947-70E740481C1C}">
-                <a14:useLocalDpi xmlns:a14="http://schemas.microsoft.com/office/drawing/2010/main" val="0"/>
-              </a:ext>
-            </a:extLst>
-          </a:blip>
-          <a:stretch>
-            <a:fillRect/>
-          </a:stretch>
-        </p:blipFill>
-        <p:spPr>
-          <a:xfrm>
-            <a:off x="18600459" y="12032535"/>
-            <a:ext cx="1638487" cy="1638487"/>
-          </a:xfrm>
-          <a:prstGeom prst="rect">
-            <a:avLst/>
-          </a:prstGeom>
-        </p:spPr>
-      </p:pic>
-      <p:pic>
-        <p:nvPicPr>
-          <p:cNvPr id="21" name="Imagem 20">
-            <a:extLst>
-              <a:ext uri="{FF2B5EF4-FFF2-40B4-BE49-F238E27FC236}">
-                <a16:creationId xmlns:a16="http://schemas.microsoft.com/office/drawing/2014/main" id="{1750DFD2-861E-4FD9-AC59-CBB875309199}"/>
-              </a:ext>
-            </a:extLst>
-          </p:cNvPr>
-          <p:cNvPicPr>
-            <a:picLocks noChangeAspect="1"/>
-          </p:cNvPicPr>
-          <p:nvPr/>
-        </p:nvPicPr>
-        <p:blipFill>
-          <a:blip r:embed="rId20" cstate="print">
-            <a:extLst>
-              <a:ext uri="{28A0092B-C50C-407E-A947-70E740481C1C}">
-                <a14:useLocalDpi xmlns:a14="http://schemas.microsoft.com/office/drawing/2010/main" val="0"/>
-              </a:ext>
-            </a:extLst>
-          </a:blip>
-          <a:stretch>
-            <a:fillRect/>
-          </a:stretch>
-        </p:blipFill>
-        <p:spPr>
-          <a:xfrm>
-            <a:off x="18824276" y="25850505"/>
-            <a:ext cx="4963926" cy="5790438"/>
+            <a:off x="19134663" y="24126485"/>
+            <a:ext cx="6181591" cy="7210850"/>
           </a:xfrm>
           <a:prstGeom prst="rect">
             <a:avLst/>
@@ -7252,6 +7185,26 @@
 </file>
 
 <file path=customXml/item1.xml><?xml version="1.0" encoding="utf-8"?>
+<p:properties xmlns:p="http://schemas.microsoft.com/office/2006/metadata/properties" xmlns:xsi="http://www.w3.org/2001/XMLSchema-instance" xmlns:pc="http://schemas.microsoft.com/office/infopath/2007/PartnerControls">
+  <documentManagement>
+    <lcf76f155ced4ddcb4097134ff3c332f xmlns="8ca2a57e-8138-4b57-956a-eb6e2c7049cc">
+      <Terms xmlns="http://schemas.microsoft.com/office/infopath/2007/PartnerControls"/>
+    </lcf76f155ced4ddcb4097134ff3c332f>
+    <TaxCatchAll xmlns="1d2798d9-1030-4cc5-be7b-200f9e628651" xsi:nil="true"/>
+  </documentManagement>
+</p:properties>
+</file>
+
+<file path=customXml/item2.xml><?xml version="1.0" encoding="utf-8"?>
+<?mso-contentType ?>
+<FormTemplates xmlns="http://schemas.microsoft.com/sharepoint/v3/contenttype/forms">
+  <Display>DocumentLibraryForm</Display>
+  <Edit>DocumentLibraryForm</Edit>
+  <New>DocumentLibraryForm</New>
+</FormTemplates>
+</file>
+
+<file path=customXml/item3.xml><?xml version="1.0" encoding="utf-8"?>
 <ct:contentTypeSchema xmlns:ct="http://schemas.microsoft.com/office/2006/metadata/contentType" xmlns:ma="http://schemas.microsoft.com/office/2006/metadata/properties/metaAttributes" ct:_="" ma:_="" ma:contentTypeName="Documento" ma:contentTypeID="0x01010045364877AF745B4281652B53F43C594A" ma:contentTypeVersion="15" ma:contentTypeDescription="Crie um novo documento." ma:contentTypeScope="" ma:versionID="440a6fbbcbce65e3f8e2bed610644788">
   <xsd:schema xmlns:xsd="http://www.w3.org/2001/XMLSchema" xmlns:xs="http://www.w3.org/2001/XMLSchema" xmlns:p="http://schemas.microsoft.com/office/2006/metadata/properties" xmlns:ns2="1d2798d9-1030-4cc5-be7b-200f9e628651" xmlns:ns3="8ca2a57e-8138-4b57-956a-eb6e2c7049cc" targetNamespace="http://schemas.microsoft.com/office/2006/metadata/properties" ma:root="true" ma:fieldsID="3ff20d9b6411658b7762fa2c08d7e1af" ns2:_="" ns3:_="">
     <xsd:import namespace="1d2798d9-1030-4cc5-be7b-200f9e628651"/>
@@ -7486,27 +7439,32 @@
 </ct:contentTypeSchema>
 </file>
 
-<file path=customXml/item2.xml><?xml version="1.0" encoding="utf-8"?>
-<?mso-contentType ?>
-<FormTemplates xmlns="http://schemas.microsoft.com/sharepoint/v3/contenttype/forms">
-  <Display>DocumentLibraryForm</Display>
-  <Edit>DocumentLibraryForm</Edit>
-  <New>DocumentLibraryForm</New>
-</FormTemplates>
+<file path=customXml/itemProps1.xml><?xml version="1.0" encoding="utf-8"?>
+<ds:datastoreItem xmlns:ds="http://schemas.openxmlformats.org/officeDocument/2006/customXml" ds:itemID="{8C580D08-C850-4D98-9BB0-6190D1509D8A}">
+  <ds:schemaRefs>
+    <ds:schemaRef ds:uri="http://purl.org/dc/terms/"/>
+    <ds:schemaRef ds:uri="http://www.w3.org/XML/1998/namespace"/>
+    <ds:schemaRef ds:uri="http://schemas.microsoft.com/office/2006/documentManagement/types"/>
+    <ds:schemaRef ds:uri="http://schemas.openxmlformats.org/package/2006/metadata/core-properties"/>
+    <ds:schemaRef ds:uri="http://purl.org/dc/elements/1.1/"/>
+    <ds:schemaRef ds:uri="http://schemas.microsoft.com/office/2006/metadata/properties"/>
+    <ds:schemaRef ds:uri="1d2798d9-1030-4cc5-be7b-200f9e628651"/>
+    <ds:schemaRef ds:uri="http://schemas.microsoft.com/office/infopath/2007/PartnerControls"/>
+    <ds:schemaRef ds:uri="8ca2a57e-8138-4b57-956a-eb6e2c7049cc"/>
+    <ds:schemaRef ds:uri="http://purl.org/dc/dcmitype/"/>
+  </ds:schemaRefs>
+</ds:datastoreItem>
 </file>
 
-<file path=customXml/item3.xml><?xml version="1.0" encoding="utf-8"?>
-<p:properties xmlns:p="http://schemas.microsoft.com/office/2006/metadata/properties" xmlns:xsi="http://www.w3.org/2001/XMLSchema-instance" xmlns:pc="http://schemas.microsoft.com/office/infopath/2007/PartnerControls">
-  <documentManagement>
-    <lcf76f155ced4ddcb4097134ff3c332f xmlns="8ca2a57e-8138-4b57-956a-eb6e2c7049cc">
-      <Terms xmlns="http://schemas.microsoft.com/office/infopath/2007/PartnerControls"/>
-    </lcf76f155ced4ddcb4097134ff3c332f>
-    <TaxCatchAll xmlns="1d2798d9-1030-4cc5-be7b-200f9e628651" xsi:nil="true"/>
-  </documentManagement>
-</p:properties>
+<file path=customXml/itemProps2.xml><?xml version="1.0" encoding="utf-8"?>
+<ds:datastoreItem xmlns:ds="http://schemas.openxmlformats.org/officeDocument/2006/customXml" ds:itemID="{20511531-72C6-41EA-909D-35A50B0891E1}">
+  <ds:schemaRefs>
+    <ds:schemaRef ds:uri="http://schemas.microsoft.com/sharepoint/v3/contenttype/forms"/>
+  </ds:schemaRefs>
+</ds:datastoreItem>
 </file>
 
-<file path=customXml/itemProps1.xml><?xml version="1.0" encoding="utf-8"?>
+<file path=customXml/itemProps3.xml><?xml version="1.0" encoding="utf-8"?>
 <ds:datastoreItem xmlns:ds="http://schemas.openxmlformats.org/officeDocument/2006/customXml" ds:itemID="{B0583F25-0BD0-426F-9D18-6079E5A02729}">
   <ds:schemaRefs>
     <ds:schemaRef ds:uri="http://schemas.microsoft.com/office/2006/metadata/contentType"/>
@@ -7523,29 +7481,4 @@
     <ds:schemaRef ds:uri="http://schemas.microsoft.com/internal/obd"/>
   </ds:schemaRefs>
 </ds:datastoreItem>
-</file>
-
-<file path=customXml/itemProps2.xml><?xml version="1.0" encoding="utf-8"?>
-<ds:datastoreItem xmlns:ds="http://schemas.openxmlformats.org/officeDocument/2006/customXml" ds:itemID="{20511531-72C6-41EA-909D-35A50B0891E1}">
-  <ds:schemaRefs>
-    <ds:schemaRef ds:uri="http://schemas.microsoft.com/sharepoint/v3/contenttype/forms"/>
-  </ds:schemaRefs>
-</ds:datastoreItem>
-</file>
-
-<file path=customXml/itemProps3.xml><?xml version="1.0" encoding="utf-8"?>
-<ds:datastoreItem xmlns:ds="http://schemas.openxmlformats.org/officeDocument/2006/customXml" ds:itemID="{8C580D08-C850-4D98-9BB0-6190D1509D8A}">
-  <ds:schemaRefs>
-    <ds:schemaRef ds:uri="http://purl.org/dc/terms/"/>
-    <ds:schemaRef ds:uri="http://www.w3.org/XML/1998/namespace"/>
-    <ds:schemaRef ds:uri="http://schemas.microsoft.com/office/2006/documentManagement/types"/>
-    <ds:schemaRef ds:uri="http://schemas.openxmlformats.org/package/2006/metadata/core-properties"/>
-    <ds:schemaRef ds:uri="http://purl.org/dc/elements/1.1/"/>
-    <ds:schemaRef ds:uri="http://schemas.microsoft.com/office/2006/metadata/properties"/>
-    <ds:schemaRef ds:uri="1d2798d9-1030-4cc5-be7b-200f9e628651"/>
-    <ds:schemaRef ds:uri="http://schemas.microsoft.com/office/infopath/2007/PartnerControls"/>
-    <ds:schemaRef ds:uri="8ca2a57e-8138-4b57-956a-eb6e2c7049cc"/>
-    <ds:schemaRef ds:uri="http://purl.org/dc/dcmitype/"/>
-  </ds:schemaRefs>
-</ds:datastoreItem>
 </file>
</xml_diff>